<commit_message>
Add title page and table of contents
</commit_message>
<xml_diff>
--- a/src/Блок схема.pptx
+++ b/src/Блок схема.pptx
@@ -288,7 +288,8 @@
           <a:p>
             <a:fld id="{E12DC19E-FB92-4CA6-95FF-490739A3C739}" type="datetimeFigureOut">
               <a:rPr lang="ru-RU" smtClean="0"/>
-              <a:t>28.05.2018</a:t>
+              <a:pPr/>
+              <a:t>31.05.2018</a:t>
             </a:fld>
             <a:endParaRPr lang="ru-RU"/>
           </a:p>
@@ -330,6 +331,7 @@
           <a:p>
             <a:fld id="{29330B79-5C13-4591-8121-0910F3093780}" type="slidenum">
               <a:rPr lang="ru-RU" smtClean="0"/>
+              <a:pPr/>
               <a:t>‹#›</a:t>
             </a:fld>
             <a:endParaRPr lang="ru-RU"/>
@@ -339,7 +341,7 @@
     </p:spTree>
     <p:extLst>
       <p:ext uri="{BB962C8B-B14F-4D97-AF65-F5344CB8AC3E}">
-        <p14:creationId xmlns:p14="http://schemas.microsoft.com/office/powerpoint/2010/main" val="2599831336"/>
+        <p14:creationId xmlns:p14="http://schemas.microsoft.com/office/powerpoint/2010/main" xmlns="" val="2599831336"/>
       </p:ext>
     </p:extLst>
   </p:cSld>
@@ -458,7 +460,8 @@
           <a:p>
             <a:fld id="{E12DC19E-FB92-4CA6-95FF-490739A3C739}" type="datetimeFigureOut">
               <a:rPr lang="ru-RU" smtClean="0"/>
-              <a:t>28.05.2018</a:t>
+              <a:pPr/>
+              <a:t>31.05.2018</a:t>
             </a:fld>
             <a:endParaRPr lang="ru-RU"/>
           </a:p>
@@ -500,6 +503,7 @@
           <a:p>
             <a:fld id="{29330B79-5C13-4591-8121-0910F3093780}" type="slidenum">
               <a:rPr lang="ru-RU" smtClean="0"/>
+              <a:pPr/>
               <a:t>‹#›</a:t>
             </a:fld>
             <a:endParaRPr lang="ru-RU"/>
@@ -509,7 +513,7 @@
     </p:spTree>
     <p:extLst>
       <p:ext uri="{BB962C8B-B14F-4D97-AF65-F5344CB8AC3E}">
-        <p14:creationId xmlns:p14="http://schemas.microsoft.com/office/powerpoint/2010/main" val="2638195391"/>
+        <p14:creationId xmlns:p14="http://schemas.microsoft.com/office/powerpoint/2010/main" xmlns="" val="2638195391"/>
       </p:ext>
     </p:extLst>
   </p:cSld>
@@ -638,7 +642,8 @@
           <a:p>
             <a:fld id="{E12DC19E-FB92-4CA6-95FF-490739A3C739}" type="datetimeFigureOut">
               <a:rPr lang="ru-RU" smtClean="0"/>
-              <a:t>28.05.2018</a:t>
+              <a:pPr/>
+              <a:t>31.05.2018</a:t>
             </a:fld>
             <a:endParaRPr lang="ru-RU"/>
           </a:p>
@@ -680,6 +685,7 @@
           <a:p>
             <a:fld id="{29330B79-5C13-4591-8121-0910F3093780}" type="slidenum">
               <a:rPr lang="ru-RU" smtClean="0"/>
+              <a:pPr/>
               <a:t>‹#›</a:t>
             </a:fld>
             <a:endParaRPr lang="ru-RU"/>
@@ -689,7 +695,7 @@
     </p:spTree>
     <p:extLst>
       <p:ext uri="{BB962C8B-B14F-4D97-AF65-F5344CB8AC3E}">
-        <p14:creationId xmlns:p14="http://schemas.microsoft.com/office/powerpoint/2010/main" val="2433078035"/>
+        <p14:creationId xmlns:p14="http://schemas.microsoft.com/office/powerpoint/2010/main" xmlns="" val="2433078035"/>
       </p:ext>
     </p:extLst>
   </p:cSld>
@@ -808,7 +814,8 @@
           <a:p>
             <a:fld id="{E12DC19E-FB92-4CA6-95FF-490739A3C739}" type="datetimeFigureOut">
               <a:rPr lang="ru-RU" smtClean="0"/>
-              <a:t>28.05.2018</a:t>
+              <a:pPr/>
+              <a:t>31.05.2018</a:t>
             </a:fld>
             <a:endParaRPr lang="ru-RU"/>
           </a:p>
@@ -850,6 +857,7 @@
           <a:p>
             <a:fld id="{29330B79-5C13-4591-8121-0910F3093780}" type="slidenum">
               <a:rPr lang="ru-RU" smtClean="0"/>
+              <a:pPr/>
               <a:t>‹#›</a:t>
             </a:fld>
             <a:endParaRPr lang="ru-RU"/>
@@ -859,7 +867,7 @@
     </p:spTree>
     <p:extLst>
       <p:ext uri="{BB962C8B-B14F-4D97-AF65-F5344CB8AC3E}">
-        <p14:creationId xmlns:p14="http://schemas.microsoft.com/office/powerpoint/2010/main" val="1758426703"/>
+        <p14:creationId xmlns:p14="http://schemas.microsoft.com/office/powerpoint/2010/main" xmlns="" val="1758426703"/>
       </p:ext>
     </p:extLst>
   </p:cSld>
@@ -1054,7 +1062,8 @@
           <a:p>
             <a:fld id="{E12DC19E-FB92-4CA6-95FF-490739A3C739}" type="datetimeFigureOut">
               <a:rPr lang="ru-RU" smtClean="0"/>
-              <a:t>28.05.2018</a:t>
+              <a:pPr/>
+              <a:t>31.05.2018</a:t>
             </a:fld>
             <a:endParaRPr lang="ru-RU"/>
           </a:p>
@@ -1096,6 +1105,7 @@
           <a:p>
             <a:fld id="{29330B79-5C13-4591-8121-0910F3093780}" type="slidenum">
               <a:rPr lang="ru-RU" smtClean="0"/>
+              <a:pPr/>
               <a:t>‹#›</a:t>
             </a:fld>
             <a:endParaRPr lang="ru-RU"/>
@@ -1105,7 +1115,7 @@
     </p:spTree>
     <p:extLst>
       <p:ext uri="{BB962C8B-B14F-4D97-AF65-F5344CB8AC3E}">
-        <p14:creationId xmlns:p14="http://schemas.microsoft.com/office/powerpoint/2010/main" val="2971392756"/>
+        <p14:creationId xmlns:p14="http://schemas.microsoft.com/office/powerpoint/2010/main" xmlns="" val="2971392756"/>
       </p:ext>
     </p:extLst>
   </p:cSld>
@@ -1342,7 +1352,8 @@
           <a:p>
             <a:fld id="{E12DC19E-FB92-4CA6-95FF-490739A3C739}" type="datetimeFigureOut">
               <a:rPr lang="ru-RU" smtClean="0"/>
-              <a:t>28.05.2018</a:t>
+              <a:pPr/>
+              <a:t>31.05.2018</a:t>
             </a:fld>
             <a:endParaRPr lang="ru-RU"/>
           </a:p>
@@ -1384,6 +1395,7 @@
           <a:p>
             <a:fld id="{29330B79-5C13-4591-8121-0910F3093780}" type="slidenum">
               <a:rPr lang="ru-RU" smtClean="0"/>
+              <a:pPr/>
               <a:t>‹#›</a:t>
             </a:fld>
             <a:endParaRPr lang="ru-RU"/>
@@ -1393,7 +1405,7 @@
     </p:spTree>
     <p:extLst>
       <p:ext uri="{BB962C8B-B14F-4D97-AF65-F5344CB8AC3E}">
-        <p14:creationId xmlns:p14="http://schemas.microsoft.com/office/powerpoint/2010/main" val="3532980905"/>
+        <p14:creationId xmlns:p14="http://schemas.microsoft.com/office/powerpoint/2010/main" xmlns="" val="3532980905"/>
       </p:ext>
     </p:extLst>
   </p:cSld>
@@ -1764,7 +1776,8 @@
           <a:p>
             <a:fld id="{E12DC19E-FB92-4CA6-95FF-490739A3C739}" type="datetimeFigureOut">
               <a:rPr lang="ru-RU" smtClean="0"/>
-              <a:t>28.05.2018</a:t>
+              <a:pPr/>
+              <a:t>31.05.2018</a:t>
             </a:fld>
             <a:endParaRPr lang="ru-RU"/>
           </a:p>
@@ -1806,6 +1819,7 @@
           <a:p>
             <a:fld id="{29330B79-5C13-4591-8121-0910F3093780}" type="slidenum">
               <a:rPr lang="ru-RU" smtClean="0"/>
+              <a:pPr/>
               <a:t>‹#›</a:t>
             </a:fld>
             <a:endParaRPr lang="ru-RU"/>
@@ -1815,7 +1829,7 @@
     </p:spTree>
     <p:extLst>
       <p:ext uri="{BB962C8B-B14F-4D97-AF65-F5344CB8AC3E}">
-        <p14:creationId xmlns:p14="http://schemas.microsoft.com/office/powerpoint/2010/main" val="350540889"/>
+        <p14:creationId xmlns:p14="http://schemas.microsoft.com/office/powerpoint/2010/main" xmlns="" val="350540889"/>
       </p:ext>
     </p:extLst>
   </p:cSld>
@@ -1882,7 +1896,8 @@
           <a:p>
             <a:fld id="{E12DC19E-FB92-4CA6-95FF-490739A3C739}" type="datetimeFigureOut">
               <a:rPr lang="ru-RU" smtClean="0"/>
-              <a:t>28.05.2018</a:t>
+              <a:pPr/>
+              <a:t>31.05.2018</a:t>
             </a:fld>
             <a:endParaRPr lang="ru-RU"/>
           </a:p>
@@ -1924,6 +1939,7 @@
           <a:p>
             <a:fld id="{29330B79-5C13-4591-8121-0910F3093780}" type="slidenum">
               <a:rPr lang="ru-RU" smtClean="0"/>
+              <a:pPr/>
               <a:t>‹#›</a:t>
             </a:fld>
             <a:endParaRPr lang="ru-RU"/>
@@ -1933,7 +1949,7 @@
     </p:spTree>
     <p:extLst>
       <p:ext uri="{BB962C8B-B14F-4D97-AF65-F5344CB8AC3E}">
-        <p14:creationId xmlns:p14="http://schemas.microsoft.com/office/powerpoint/2010/main" val="4242302754"/>
+        <p14:creationId xmlns:p14="http://schemas.microsoft.com/office/powerpoint/2010/main" xmlns="" val="4242302754"/>
       </p:ext>
     </p:extLst>
   </p:cSld>
@@ -1977,7 +1993,8 @@
           <a:p>
             <a:fld id="{E12DC19E-FB92-4CA6-95FF-490739A3C739}" type="datetimeFigureOut">
               <a:rPr lang="ru-RU" smtClean="0"/>
-              <a:t>28.05.2018</a:t>
+              <a:pPr/>
+              <a:t>31.05.2018</a:t>
             </a:fld>
             <a:endParaRPr lang="ru-RU"/>
           </a:p>
@@ -2019,6 +2036,7 @@
           <a:p>
             <a:fld id="{29330B79-5C13-4591-8121-0910F3093780}" type="slidenum">
               <a:rPr lang="ru-RU" smtClean="0"/>
+              <a:pPr/>
               <a:t>‹#›</a:t>
             </a:fld>
             <a:endParaRPr lang="ru-RU"/>
@@ -2028,7 +2046,7 @@
     </p:spTree>
     <p:extLst>
       <p:ext uri="{BB962C8B-B14F-4D97-AF65-F5344CB8AC3E}">
-        <p14:creationId xmlns:p14="http://schemas.microsoft.com/office/powerpoint/2010/main" val="4216687292"/>
+        <p14:creationId xmlns:p14="http://schemas.microsoft.com/office/powerpoint/2010/main" xmlns="" val="4216687292"/>
       </p:ext>
     </p:extLst>
   </p:cSld>
@@ -2254,7 +2272,8 @@
           <a:p>
             <a:fld id="{E12DC19E-FB92-4CA6-95FF-490739A3C739}" type="datetimeFigureOut">
               <a:rPr lang="ru-RU" smtClean="0"/>
-              <a:t>28.05.2018</a:t>
+              <a:pPr/>
+              <a:t>31.05.2018</a:t>
             </a:fld>
             <a:endParaRPr lang="ru-RU"/>
           </a:p>
@@ -2296,6 +2315,7 @@
           <a:p>
             <a:fld id="{29330B79-5C13-4591-8121-0910F3093780}" type="slidenum">
               <a:rPr lang="ru-RU" smtClean="0"/>
+              <a:pPr/>
               <a:t>‹#›</a:t>
             </a:fld>
             <a:endParaRPr lang="ru-RU"/>
@@ -2305,7 +2325,7 @@
     </p:spTree>
     <p:extLst>
       <p:ext uri="{BB962C8B-B14F-4D97-AF65-F5344CB8AC3E}">
-        <p14:creationId xmlns:p14="http://schemas.microsoft.com/office/powerpoint/2010/main" val="1206200385"/>
+        <p14:creationId xmlns:p14="http://schemas.microsoft.com/office/powerpoint/2010/main" xmlns="" val="1206200385"/>
       </p:ext>
     </p:extLst>
   </p:cSld>
@@ -2507,7 +2527,8 @@
           <a:p>
             <a:fld id="{E12DC19E-FB92-4CA6-95FF-490739A3C739}" type="datetimeFigureOut">
               <a:rPr lang="ru-RU" smtClean="0"/>
-              <a:t>28.05.2018</a:t>
+              <a:pPr/>
+              <a:t>31.05.2018</a:t>
             </a:fld>
             <a:endParaRPr lang="ru-RU"/>
           </a:p>
@@ -2549,6 +2570,7 @@
           <a:p>
             <a:fld id="{29330B79-5C13-4591-8121-0910F3093780}" type="slidenum">
               <a:rPr lang="ru-RU" smtClean="0"/>
+              <a:pPr/>
               <a:t>‹#›</a:t>
             </a:fld>
             <a:endParaRPr lang="ru-RU"/>
@@ -2558,7 +2580,7 @@
     </p:spTree>
     <p:extLst>
       <p:ext uri="{BB962C8B-B14F-4D97-AF65-F5344CB8AC3E}">
-        <p14:creationId xmlns:p14="http://schemas.microsoft.com/office/powerpoint/2010/main" val="3538211585"/>
+        <p14:creationId xmlns:p14="http://schemas.microsoft.com/office/powerpoint/2010/main" xmlns="" val="3538211585"/>
       </p:ext>
     </p:extLst>
   </p:cSld>
@@ -2720,7 +2742,8 @@
           <a:p>
             <a:fld id="{E12DC19E-FB92-4CA6-95FF-490739A3C739}" type="datetimeFigureOut">
               <a:rPr lang="ru-RU" smtClean="0"/>
-              <a:t>28.05.2018</a:t>
+              <a:pPr/>
+              <a:t>31.05.2018</a:t>
             </a:fld>
             <a:endParaRPr lang="ru-RU"/>
           </a:p>
@@ -2798,6 +2821,7 @@
           <a:p>
             <a:fld id="{29330B79-5C13-4591-8121-0910F3093780}" type="slidenum">
               <a:rPr lang="ru-RU" smtClean="0"/>
+              <a:pPr/>
               <a:t>‹#›</a:t>
             </a:fld>
             <a:endParaRPr lang="ru-RU"/>
@@ -2807,7 +2831,7 @@
     </p:spTree>
     <p:extLst>
       <p:ext uri="{BB962C8B-B14F-4D97-AF65-F5344CB8AC3E}">
-        <p14:creationId xmlns:p14="http://schemas.microsoft.com/office/powerpoint/2010/main" val="1879437221"/>
+        <p14:creationId xmlns:p14="http://schemas.microsoft.com/office/powerpoint/2010/main" xmlns="" val="1879437221"/>
       </p:ext>
     </p:extLst>
   </p:cSld>
@@ -3105,8 +3129,8 @@
         </p:nvSpPr>
         <p:spPr bwMode="auto">
           <a:xfrm>
-            <a:off x="1506536" y="2215415"/>
-            <a:ext cx="579438" cy="1031875"/>
+            <a:off x="1835696" y="2564904"/>
+            <a:ext cx="1337272" cy="288032"/>
           </a:xfrm>
           <a:prstGeom prst="rect">
             <a:avLst/>
@@ -3131,7 +3155,11 @@
           </a:bodyPr>
           <a:lstStyle/>
           <a:p>
-            <a:endParaRPr lang="ru-RU"/>
+            <a:r>
+              <a:rPr lang="en-US" sz="1200" dirty="0" smtClean="0"/>
+              <a:t>Argument parser</a:t>
+            </a:r>
+            <a:endParaRPr lang="ru-RU" sz="1200" dirty="0"/>
           </a:p>
         </p:txBody>
       </p:sp>
@@ -3145,7 +3173,7 @@
         </p:nvSpPr>
         <p:spPr bwMode="auto">
           <a:xfrm>
-            <a:off x="4884663" y="3849243"/>
+            <a:off x="5172695" y="3849243"/>
             <a:ext cx="1131888" cy="525462"/>
           </a:xfrm>
           <a:prstGeom prst="roundRect">
@@ -3191,7 +3219,7 @@
         </p:nvSpPr>
         <p:spPr bwMode="auto">
           <a:xfrm>
-            <a:off x="2449555" y="3885755"/>
+            <a:off x="2737587" y="3885755"/>
             <a:ext cx="1131888" cy="488950"/>
           </a:xfrm>
           <a:prstGeom prst="roundRect">
@@ -3242,7 +3270,7 @@
         </p:nvSpPr>
         <p:spPr bwMode="auto">
           <a:xfrm>
-            <a:off x="3499389" y="2929790"/>
+            <a:off x="3787421" y="2929790"/>
             <a:ext cx="1296144" cy="635000"/>
           </a:xfrm>
           <a:prstGeom prst="flowChartDecision">
@@ -3288,7 +3316,7 @@
         </p:nvCxnSpPr>
         <p:spPr bwMode="auto">
           <a:xfrm rot="10800000" flipV="1">
-            <a:off x="3015499" y="3247289"/>
+            <a:off x="3303531" y="3247289"/>
             <a:ext cx="483890" cy="638465"/>
           </a:xfrm>
           <a:prstGeom prst="bentConnector2">
@@ -3305,7 +3333,7 @@
           </a:ln>
           <a:extLst>
             <a:ext uri="{909E8E84-426E-40DD-AFC4-6F175D3DCCD1}">
-              <a14:hiddenFill xmlns:a14="http://schemas.microsoft.com/office/drawing/2010/main">
+              <a14:hiddenFill xmlns:a14="http://schemas.microsoft.com/office/drawing/2010/main" xmlns="">
                 <a:noFill/>
               </a14:hiddenFill>
             </a:ext>
@@ -3320,7 +3348,7 @@
         </p:nvSpPr>
         <p:spPr>
           <a:xfrm>
-            <a:off x="683568" y="2065900"/>
+            <a:off x="971600" y="2060848"/>
             <a:ext cx="432048" cy="1330905"/>
           </a:xfrm>
           <a:prstGeom prst="rightBrace">
@@ -3355,49 +3383,6 @@
           </a:p>
         </p:txBody>
       </p:sp>
-      <p:sp>
-        <p:nvSpPr>
-          <p:cNvPr id="15" name="TextBox 14"/>
-          <p:cNvSpPr txBox="1"/>
-          <p:nvPr/>
-        </p:nvSpPr>
-        <p:spPr>
-          <a:xfrm>
-            <a:off x="107504" y="2495467"/>
-            <a:ext cx="758221" cy="461665"/>
-          </a:xfrm>
-          <a:prstGeom prst="rect">
-            <a:avLst/>
-          </a:prstGeom>
-          <a:noFill/>
-          <a:ln>
-            <a:noFill/>
-          </a:ln>
-        </p:spPr>
-        <p:txBody>
-          <a:bodyPr wrap="none" rtlCol="0">
-            <a:spAutoFit/>
-          </a:bodyPr>
-          <a:lstStyle/>
-          <a:p>
-            <a:r>
-              <a:rPr lang="ru-RU" sz="1200" dirty="0"/>
-              <a:t>В</a:t>
-            </a:r>
-            <a:r>
-              <a:rPr lang="ru-RU" sz="1200" dirty="0" smtClean="0"/>
-              <a:t>ходные</a:t>
-            </a:r>
-          </a:p>
-          <a:p>
-            <a:r>
-              <a:rPr lang="ru-RU" sz="1200" dirty="0" smtClean="0"/>
-              <a:t>данные</a:t>
-            </a:r>
-            <a:endParaRPr lang="ru-RU" sz="1200" dirty="0"/>
-          </a:p>
-        </p:txBody>
-      </p:sp>
       <p:cxnSp>
         <p:nvCxnSpPr>
           <p:cNvPr id="17" name="Прямая со стрелкой 16"/>
@@ -3408,9 +3393,9 @@
           <p:nvPr/>
         </p:nvCxnSpPr>
         <p:spPr>
-          <a:xfrm>
-            <a:off x="1115616" y="2731353"/>
-            <a:ext cx="390920" cy="0"/>
+          <a:xfrm flipV="1">
+            <a:off x="1403648" y="2708920"/>
+            <a:ext cx="432048" cy="17381"/>
           </a:xfrm>
           <a:prstGeom prst="straightConnector1">
             <a:avLst/>
@@ -3445,7 +3430,7 @@
         </p:nvSpPr>
         <p:spPr>
           <a:xfrm>
-            <a:off x="2098005" y="2453648"/>
+            <a:off x="3347864" y="2492896"/>
             <a:ext cx="966803" cy="276999"/>
           </a:xfrm>
           <a:prstGeom prst="rect">
@@ -3476,7 +3461,7 @@
         </p:nvSpPr>
         <p:spPr>
           <a:xfrm>
-            <a:off x="3657099" y="4824318"/>
+            <a:off x="3945131" y="4824318"/>
             <a:ext cx="1224136" cy="571392"/>
           </a:xfrm>
           <a:prstGeom prst="roundRect">
@@ -3521,7 +3506,7 @@
         </p:nvCxnSpPr>
         <p:spPr>
           <a:xfrm>
-            <a:off x="4795533" y="3247290"/>
+            <a:off x="5083565" y="3247290"/>
             <a:ext cx="655074" cy="601953"/>
           </a:xfrm>
           <a:prstGeom prst="bentConnector2">
@@ -3559,7 +3544,7 @@
         </p:nvCxnSpPr>
         <p:spPr>
           <a:xfrm>
-            <a:off x="3581443" y="4130230"/>
+            <a:off x="3869475" y="4130230"/>
             <a:ext cx="486501" cy="694088"/>
           </a:xfrm>
           <a:prstGeom prst="bentConnector2">
@@ -3594,7 +3579,7 @@
         </p:nvCxnSpPr>
         <p:spPr>
           <a:xfrm rot="10800000" flipV="1">
-            <a:off x="4499993" y="4111974"/>
+            <a:off x="4788025" y="4111974"/>
             <a:ext cx="384671" cy="712344"/>
           </a:xfrm>
           <a:prstGeom prst="bentConnector2">
@@ -3630,8 +3615,8 @@
         </p:nvCxnSpPr>
         <p:spPr>
           <a:xfrm>
-            <a:off x="2085974" y="2731353"/>
-            <a:ext cx="2061487" cy="198437"/>
+            <a:off x="3172968" y="2708920"/>
+            <a:ext cx="1262525" cy="220870"/>
           </a:xfrm>
           <a:prstGeom prst="bentConnector2">
             <a:avLst/>
@@ -3655,10 +3640,265 @@
           </a:fontRef>
         </p:style>
       </p:cxnSp>
+      <p:sp>
+        <p:nvSpPr>
+          <p:cNvPr id="16" name="Прямоугольник 15"/>
+          <p:cNvSpPr/>
+          <p:nvPr/>
+        </p:nvSpPr>
+        <p:spPr>
+          <a:xfrm>
+            <a:off x="1691680" y="4797152"/>
+            <a:ext cx="1296144" cy="648072"/>
+          </a:xfrm>
+          <a:prstGeom prst="rect">
+            <a:avLst/>
+          </a:prstGeom>
+          <a:ln w="3175">
+            <a:solidFill>
+              <a:schemeClr val="tx1"/>
+            </a:solidFill>
+          </a:ln>
+        </p:spPr>
+        <p:style>
+          <a:lnRef idx="2">
+            <a:schemeClr val="accent6"/>
+          </a:lnRef>
+          <a:fillRef idx="1">
+            <a:schemeClr val="lt1"/>
+          </a:fillRef>
+          <a:effectRef idx="0">
+            <a:schemeClr val="accent6"/>
+          </a:effectRef>
+          <a:fontRef idx="minor">
+            <a:schemeClr val="dk1"/>
+          </a:fontRef>
+        </p:style>
+        <p:txBody>
+          <a:bodyPr rtlCol="0" anchor="ctr"/>
+          <a:lstStyle/>
+          <a:p>
+            <a:pPr algn="ctr"/>
+            <a:r>
+              <a:rPr lang="en-US" sz="1200" dirty="0" smtClean="0"/>
+              <a:t>Format the results and writing to file</a:t>
+            </a:r>
+            <a:endParaRPr lang="ru-RU" sz="1100" dirty="0"/>
+          </a:p>
+        </p:txBody>
+      </p:sp>
+      <p:cxnSp>
+        <p:nvCxnSpPr>
+          <p:cNvPr id="19" name="Прямая со стрелкой 18"/>
+          <p:cNvCxnSpPr>
+            <a:stCxn id="31" idx="1"/>
+            <a:endCxn id="16" idx="3"/>
+          </p:cNvCxnSpPr>
+          <p:nvPr/>
+        </p:nvCxnSpPr>
+        <p:spPr>
+          <a:xfrm flipH="1">
+            <a:off x="2987824" y="5110014"/>
+            <a:ext cx="957307" cy="11174"/>
+          </a:xfrm>
+          <a:prstGeom prst="straightConnector1">
+            <a:avLst/>
+          </a:prstGeom>
+          <a:ln>
+            <a:tailEnd type="arrow"/>
+          </a:ln>
+        </p:spPr>
+        <p:style>
+          <a:lnRef idx="1">
+            <a:schemeClr val="dk1"/>
+          </a:lnRef>
+          <a:fillRef idx="0">
+            <a:schemeClr val="dk1"/>
+          </a:fillRef>
+          <a:effectRef idx="0">
+            <a:schemeClr val="dk1"/>
+          </a:effectRef>
+          <a:fontRef idx="minor">
+            <a:schemeClr val="tx1"/>
+          </a:fontRef>
+        </p:style>
+      </p:cxnSp>
+      <p:sp>
+        <p:nvSpPr>
+          <p:cNvPr id="43" name="Овал 42"/>
+          <p:cNvSpPr/>
+          <p:nvPr/>
+        </p:nvSpPr>
+        <p:spPr>
+          <a:xfrm>
+            <a:off x="179512" y="4869160"/>
+            <a:ext cx="864096" cy="576064"/>
+          </a:xfrm>
+          <a:prstGeom prst="ellipse">
+            <a:avLst/>
+          </a:prstGeom>
+          <a:ln w="3175">
+            <a:solidFill>
+              <a:schemeClr val="tx1"/>
+            </a:solidFill>
+          </a:ln>
+        </p:spPr>
+        <p:style>
+          <a:lnRef idx="2">
+            <a:schemeClr val="accent6"/>
+          </a:lnRef>
+          <a:fillRef idx="1">
+            <a:schemeClr val="lt1"/>
+          </a:fillRef>
+          <a:effectRef idx="0">
+            <a:schemeClr val="accent6"/>
+          </a:effectRef>
+          <a:fontRef idx="minor">
+            <a:schemeClr val="dk1"/>
+          </a:fontRef>
+        </p:style>
+        <p:txBody>
+          <a:bodyPr rtlCol="0" anchor="ctr"/>
+          <a:lstStyle/>
+          <a:p>
+            <a:pPr algn="ctr"/>
+            <a:r>
+              <a:rPr lang="en-US" sz="1200" dirty="0" smtClean="0"/>
+              <a:t>File</a:t>
+            </a:r>
+          </a:p>
+        </p:txBody>
+      </p:sp>
+      <p:cxnSp>
+        <p:nvCxnSpPr>
+          <p:cNvPr id="45" name="Прямая со стрелкой 44"/>
+          <p:cNvCxnSpPr>
+            <a:stCxn id="16" idx="1"/>
+            <a:endCxn id="43" idx="6"/>
+          </p:cNvCxnSpPr>
+          <p:nvPr/>
+        </p:nvCxnSpPr>
+        <p:spPr>
+          <a:xfrm flipH="1">
+            <a:off x="1043608" y="5121188"/>
+            <a:ext cx="648072" cy="36004"/>
+          </a:xfrm>
+          <a:prstGeom prst="straightConnector1">
+            <a:avLst/>
+          </a:prstGeom>
+          <a:ln>
+            <a:tailEnd type="arrow"/>
+          </a:ln>
+        </p:spPr>
+        <p:style>
+          <a:lnRef idx="1">
+            <a:schemeClr val="dk1"/>
+          </a:lnRef>
+          <a:fillRef idx="0">
+            <a:schemeClr val="dk1"/>
+          </a:fillRef>
+          <a:effectRef idx="0">
+            <a:schemeClr val="dk1"/>
+          </a:effectRef>
+          <a:fontRef idx="minor">
+            <a:schemeClr val="tx1"/>
+          </a:fontRef>
+        </p:style>
+      </p:cxnSp>
+      <p:cxnSp>
+        <p:nvCxnSpPr>
+          <p:cNvPr id="47" name="Прямая соединительная линия 46"/>
+          <p:cNvCxnSpPr/>
+          <p:nvPr/>
+        </p:nvCxnSpPr>
+        <p:spPr>
+          <a:xfrm>
+            <a:off x="1475656" y="2348880"/>
+            <a:ext cx="0" cy="3240360"/>
+          </a:xfrm>
+          <a:prstGeom prst="line">
+            <a:avLst/>
+          </a:prstGeom>
+          <a:ln w="12700">
+            <a:solidFill>
+              <a:schemeClr val="tx1"/>
+            </a:solidFill>
+            <a:prstDash val="dash"/>
+          </a:ln>
+        </p:spPr>
+        <p:style>
+          <a:lnRef idx="1">
+            <a:schemeClr val="accent1"/>
+          </a:lnRef>
+          <a:fillRef idx="0">
+            <a:schemeClr val="accent1"/>
+          </a:fillRef>
+          <a:effectRef idx="0">
+            <a:schemeClr val="accent1"/>
+          </a:effectRef>
+          <a:fontRef idx="minor">
+            <a:schemeClr val="tx1"/>
+          </a:fontRef>
+        </p:style>
+      </p:cxnSp>
+      <p:sp>
+        <p:nvSpPr>
+          <p:cNvPr id="58" name="Овал 57"/>
+          <p:cNvSpPr/>
+          <p:nvPr/>
+        </p:nvSpPr>
+        <p:spPr>
+          <a:xfrm>
+            <a:off x="107504" y="2420888"/>
+            <a:ext cx="1008112" cy="648072"/>
+          </a:xfrm>
+          <a:prstGeom prst="ellipse">
+            <a:avLst/>
+          </a:prstGeom>
+          <a:ln w="3175">
+            <a:solidFill>
+              <a:schemeClr val="tx1"/>
+            </a:solidFill>
+          </a:ln>
+        </p:spPr>
+        <p:style>
+          <a:lnRef idx="2">
+            <a:schemeClr val="accent6"/>
+          </a:lnRef>
+          <a:fillRef idx="1">
+            <a:schemeClr val="lt1"/>
+          </a:fillRef>
+          <a:effectRef idx="0">
+            <a:schemeClr val="accent6"/>
+          </a:effectRef>
+          <a:fontRef idx="minor">
+            <a:schemeClr val="dk1"/>
+          </a:fontRef>
+        </p:style>
+        <p:txBody>
+          <a:bodyPr rtlCol="0" anchor="ctr"/>
+          <a:lstStyle/>
+          <a:p>
+            <a:endParaRPr lang="en-US" sz="1200" dirty="0" smtClean="0"/>
+          </a:p>
+          <a:p>
+            <a:pPr algn="ctr"/>
+            <a:r>
+              <a:rPr lang="en-US" sz="1200" dirty="0" smtClean="0"/>
+              <a:t>Input data</a:t>
+            </a:r>
+            <a:endParaRPr lang="ru-RU" sz="1200" dirty="0" smtClean="0"/>
+          </a:p>
+          <a:p>
+            <a:pPr algn="ctr"/>
+            <a:endParaRPr lang="en-US" sz="1200" dirty="0" smtClean="0"/>
+          </a:p>
+        </p:txBody>
+      </p:sp>
     </p:spTree>
     <p:extLst>
       <p:ext uri="{BB962C8B-B14F-4D97-AF65-F5344CB8AC3E}">
-        <p14:creationId xmlns:p14="http://schemas.microsoft.com/office/powerpoint/2010/main" val="3530386684"/>
+        <p14:creationId xmlns:p14="http://schemas.microsoft.com/office/powerpoint/2010/main" xmlns="" val="3530386684"/>
       </p:ext>
     </p:extLst>
   </p:cSld>

</xml_diff>